<commit_message>
More UI changes, added LDraw model
</commit_message>
<xml_diff>
--- a/CSC353 presentation.pptx
+++ b/CSC353 presentation.pptx
@@ -6,6 +6,14 @@
   </p:sldMasterIdLst>
   <p:sldIdLst>
     <p:sldId id="256" r:id="rId2"/>
+    <p:sldId id="257" r:id="rId3"/>
+    <p:sldId id="258" r:id="rId4"/>
+    <p:sldId id="259" r:id="rId5"/>
+    <p:sldId id="260" r:id="rId6"/>
+    <p:sldId id="261" r:id="rId7"/>
+    <p:sldId id="264" r:id="rId8"/>
+    <p:sldId id="262" r:id="rId9"/>
+    <p:sldId id="263" r:id="rId10"/>
   </p:sldIdLst>
   <p:sldSz cx="12192000" cy="6858000"/>
   <p:notesSz cx="6858000" cy="9144000"/>
@@ -5893,6 +5901,727 @@
 </p:sld>
 </file>
 
+<file path=ppt/slides/slide2.xml><?xml version="1.0" encoding="utf-8"?>
+<p:sld xmlns:a="http://schemas.openxmlformats.org/drawingml/2006/main" xmlns:r="http://schemas.openxmlformats.org/officeDocument/2006/relationships" xmlns:p="http://schemas.openxmlformats.org/presentationml/2006/main">
+  <p:cSld>
+    <p:spTree>
+      <p:nvGrpSpPr>
+        <p:cNvPr id="1" name=""/>
+        <p:cNvGrpSpPr/>
+        <p:nvPr/>
+      </p:nvGrpSpPr>
+      <p:grpSpPr>
+        <a:xfrm>
+          <a:off x="0" y="0"/>
+          <a:ext cx="0" cy="0"/>
+          <a:chOff x="0" y="0"/>
+          <a:chExt cx="0" cy="0"/>
+        </a:xfrm>
+      </p:grpSpPr>
+      <p:sp>
+        <p:nvSpPr>
+          <p:cNvPr id="2" name="Title 1">
+            <a:extLst>
+              <a:ext uri="{FF2B5EF4-FFF2-40B4-BE49-F238E27FC236}">
+                <a16:creationId xmlns:a16="http://schemas.microsoft.com/office/drawing/2014/main" id="{D638D0B8-B70A-4AEC-9B00-0477FB168F0E}"/>
+              </a:ext>
+            </a:extLst>
+          </p:cNvPr>
+          <p:cNvSpPr>
+            <a:spLocks noGrp="1"/>
+          </p:cNvSpPr>
+          <p:nvPr>
+            <p:ph type="title"/>
+          </p:nvPr>
+        </p:nvSpPr>
+        <p:spPr/>
+        <p:txBody>
+          <a:bodyPr/>
+          <a:lstStyle/>
+          <a:p>
+            <a:r>
+              <a:rPr lang="en-US" dirty="0"/>
+              <a:t>Demo</a:t>
+            </a:r>
+          </a:p>
+        </p:txBody>
+      </p:sp>
+      <p:sp>
+        <p:nvSpPr>
+          <p:cNvPr id="4" name="Text Placeholder 3">
+            <a:extLst>
+              <a:ext uri="{FF2B5EF4-FFF2-40B4-BE49-F238E27FC236}">
+                <a16:creationId xmlns:a16="http://schemas.microsoft.com/office/drawing/2014/main" id="{9E536448-5385-40B3-A684-35E37BBF9B31}"/>
+              </a:ext>
+            </a:extLst>
+          </p:cNvPr>
+          <p:cNvSpPr>
+            <a:spLocks noGrp="1"/>
+          </p:cNvSpPr>
+          <p:nvPr>
+            <p:ph type="body" idx="1"/>
+          </p:nvPr>
+        </p:nvSpPr>
+        <p:spPr/>
+        <p:txBody>
+          <a:bodyPr/>
+          <a:lstStyle/>
+          <a:p>
+            <a:endParaRPr lang="en-US"/>
+          </a:p>
+        </p:txBody>
+      </p:sp>
+    </p:spTree>
+    <p:extLst>
+      <p:ext uri="{BB962C8B-B14F-4D97-AF65-F5344CB8AC3E}">
+        <p14:creationId xmlns:p14="http://schemas.microsoft.com/office/powerpoint/2010/main" val="4069169082"/>
+      </p:ext>
+    </p:extLst>
+  </p:cSld>
+  <p:clrMapOvr>
+    <a:masterClrMapping/>
+  </p:clrMapOvr>
+</p:sld>
+</file>
+
+<file path=ppt/slides/slide3.xml><?xml version="1.0" encoding="utf-8"?>
+<p:sld xmlns:a="http://schemas.openxmlformats.org/drawingml/2006/main" xmlns:r="http://schemas.openxmlformats.org/officeDocument/2006/relationships" xmlns:p="http://schemas.openxmlformats.org/presentationml/2006/main">
+  <p:cSld>
+    <p:spTree>
+      <p:nvGrpSpPr>
+        <p:cNvPr id="1" name=""/>
+        <p:cNvGrpSpPr/>
+        <p:nvPr/>
+      </p:nvGrpSpPr>
+      <p:grpSpPr>
+        <a:xfrm>
+          <a:off x="0" y="0"/>
+          <a:ext cx="0" cy="0"/>
+          <a:chOff x="0" y="0"/>
+          <a:chExt cx="0" cy="0"/>
+        </a:xfrm>
+      </p:grpSpPr>
+      <p:sp>
+        <p:nvSpPr>
+          <p:cNvPr id="4" name="Title 3">
+            <a:extLst>
+              <a:ext uri="{FF2B5EF4-FFF2-40B4-BE49-F238E27FC236}">
+                <a16:creationId xmlns:a16="http://schemas.microsoft.com/office/drawing/2014/main" id="{0FEC93A0-8248-40C4-B198-A8F97A1D28AA}"/>
+              </a:ext>
+            </a:extLst>
+          </p:cNvPr>
+          <p:cNvSpPr>
+            <a:spLocks noGrp="1"/>
+          </p:cNvSpPr>
+          <p:nvPr>
+            <p:ph type="title"/>
+          </p:nvPr>
+        </p:nvSpPr>
+        <p:spPr/>
+        <p:txBody>
+          <a:bodyPr/>
+          <a:lstStyle/>
+          <a:p>
+            <a:r>
+              <a:rPr lang="en-US" dirty="0"/>
+              <a:t>Why?</a:t>
+            </a:r>
+          </a:p>
+        </p:txBody>
+      </p:sp>
+      <p:sp>
+        <p:nvSpPr>
+          <p:cNvPr id="5" name="Content Placeholder 4">
+            <a:extLst>
+              <a:ext uri="{FF2B5EF4-FFF2-40B4-BE49-F238E27FC236}">
+                <a16:creationId xmlns:a16="http://schemas.microsoft.com/office/drawing/2014/main" id="{759EC621-1BAE-429A-B63C-B321C6F08A07}"/>
+              </a:ext>
+            </a:extLst>
+          </p:cNvPr>
+          <p:cNvSpPr>
+            <a:spLocks noGrp="1"/>
+          </p:cNvSpPr>
+          <p:nvPr>
+            <p:ph idx="1"/>
+          </p:nvPr>
+        </p:nvSpPr>
+        <p:spPr/>
+        <p:txBody>
+          <a:bodyPr/>
+          <a:lstStyle/>
+          <a:p>
+            <a:endParaRPr lang="en-US" dirty="0"/>
+          </a:p>
+        </p:txBody>
+      </p:sp>
+    </p:spTree>
+    <p:extLst>
+      <p:ext uri="{BB962C8B-B14F-4D97-AF65-F5344CB8AC3E}">
+        <p14:creationId xmlns:p14="http://schemas.microsoft.com/office/powerpoint/2010/main" val="3572755562"/>
+      </p:ext>
+    </p:extLst>
+  </p:cSld>
+  <p:clrMapOvr>
+    <a:masterClrMapping/>
+  </p:clrMapOvr>
+</p:sld>
+</file>
+
+<file path=ppt/slides/slide4.xml><?xml version="1.0" encoding="utf-8"?>
+<p:sld xmlns:a="http://schemas.openxmlformats.org/drawingml/2006/main" xmlns:r="http://schemas.openxmlformats.org/officeDocument/2006/relationships" xmlns:p="http://schemas.openxmlformats.org/presentationml/2006/main">
+  <p:cSld>
+    <p:spTree>
+      <p:nvGrpSpPr>
+        <p:cNvPr id="1" name=""/>
+        <p:cNvGrpSpPr/>
+        <p:nvPr/>
+      </p:nvGrpSpPr>
+      <p:grpSpPr>
+        <a:xfrm>
+          <a:off x="0" y="0"/>
+          <a:ext cx="0" cy="0"/>
+          <a:chOff x="0" y="0"/>
+          <a:chExt cx="0" cy="0"/>
+        </a:xfrm>
+      </p:grpSpPr>
+      <p:sp>
+        <p:nvSpPr>
+          <p:cNvPr id="2" name="Title 1">
+            <a:extLst>
+              <a:ext uri="{FF2B5EF4-FFF2-40B4-BE49-F238E27FC236}">
+                <a16:creationId xmlns:a16="http://schemas.microsoft.com/office/drawing/2014/main" id="{27A63356-A23E-43E6-9D78-33B202AA6355}"/>
+              </a:ext>
+            </a:extLst>
+          </p:cNvPr>
+          <p:cNvSpPr>
+            <a:spLocks noGrp="1"/>
+          </p:cNvSpPr>
+          <p:nvPr>
+            <p:ph type="title"/>
+          </p:nvPr>
+        </p:nvSpPr>
+        <p:spPr/>
+        <p:txBody>
+          <a:bodyPr/>
+          <a:lstStyle/>
+          <a:p>
+            <a:r>
+              <a:rPr lang="en-US" dirty="0"/>
+              <a:t>Code</a:t>
+            </a:r>
+          </a:p>
+        </p:txBody>
+      </p:sp>
+      <p:sp>
+        <p:nvSpPr>
+          <p:cNvPr id="3" name="Content Placeholder 2">
+            <a:extLst>
+              <a:ext uri="{FF2B5EF4-FFF2-40B4-BE49-F238E27FC236}">
+                <a16:creationId xmlns:a16="http://schemas.microsoft.com/office/drawing/2014/main" id="{35E809ED-48FB-4CF9-8E4E-509377287B93}"/>
+              </a:ext>
+            </a:extLst>
+          </p:cNvPr>
+          <p:cNvSpPr>
+            <a:spLocks noGrp="1"/>
+          </p:cNvSpPr>
+          <p:nvPr>
+            <p:ph idx="1"/>
+          </p:nvPr>
+        </p:nvSpPr>
+        <p:spPr/>
+        <p:txBody>
+          <a:bodyPr/>
+          <a:lstStyle/>
+          <a:p>
+            <a:endParaRPr lang="en-US"/>
+          </a:p>
+        </p:txBody>
+      </p:sp>
+    </p:spTree>
+    <p:extLst>
+      <p:ext uri="{BB962C8B-B14F-4D97-AF65-F5344CB8AC3E}">
+        <p14:creationId xmlns:p14="http://schemas.microsoft.com/office/powerpoint/2010/main" val="3507452447"/>
+      </p:ext>
+    </p:extLst>
+  </p:cSld>
+  <p:clrMapOvr>
+    <a:masterClrMapping/>
+  </p:clrMapOvr>
+</p:sld>
+</file>
+
+<file path=ppt/slides/slide5.xml><?xml version="1.0" encoding="utf-8"?>
+<p:sld xmlns:a="http://schemas.openxmlformats.org/drawingml/2006/main" xmlns:r="http://schemas.openxmlformats.org/officeDocument/2006/relationships" xmlns:p="http://schemas.openxmlformats.org/presentationml/2006/main">
+  <p:cSld>
+    <p:spTree>
+      <p:nvGrpSpPr>
+        <p:cNvPr id="1" name=""/>
+        <p:cNvGrpSpPr/>
+        <p:nvPr/>
+      </p:nvGrpSpPr>
+      <p:grpSpPr>
+        <a:xfrm>
+          <a:off x="0" y="0"/>
+          <a:ext cx="0" cy="0"/>
+          <a:chOff x="0" y="0"/>
+          <a:chExt cx="0" cy="0"/>
+        </a:xfrm>
+      </p:grpSpPr>
+      <p:sp>
+        <p:nvSpPr>
+          <p:cNvPr id="2" name="Title 1">
+            <a:extLst>
+              <a:ext uri="{FF2B5EF4-FFF2-40B4-BE49-F238E27FC236}">
+                <a16:creationId xmlns:a16="http://schemas.microsoft.com/office/drawing/2014/main" id="{3B3698B8-D04C-451D-9011-F8EE7EAA86F4}"/>
+              </a:ext>
+            </a:extLst>
+          </p:cNvPr>
+          <p:cNvSpPr>
+            <a:spLocks noGrp="1"/>
+          </p:cNvSpPr>
+          <p:nvPr>
+            <p:ph type="title"/>
+          </p:nvPr>
+        </p:nvSpPr>
+        <p:spPr/>
+        <p:txBody>
+          <a:bodyPr/>
+          <a:lstStyle/>
+          <a:p>
+            <a:r>
+              <a:rPr lang="en-US" dirty="0"/>
+              <a:t>Difficult Parts</a:t>
+            </a:r>
+          </a:p>
+        </p:txBody>
+      </p:sp>
+      <p:sp>
+        <p:nvSpPr>
+          <p:cNvPr id="3" name="Content Placeholder 2">
+            <a:extLst>
+              <a:ext uri="{FF2B5EF4-FFF2-40B4-BE49-F238E27FC236}">
+                <a16:creationId xmlns:a16="http://schemas.microsoft.com/office/drawing/2014/main" id="{C0893D5C-193B-477B-A1F1-D3766444F09F}"/>
+              </a:ext>
+            </a:extLst>
+          </p:cNvPr>
+          <p:cNvSpPr>
+            <a:spLocks noGrp="1"/>
+          </p:cNvSpPr>
+          <p:nvPr>
+            <p:ph idx="1"/>
+          </p:nvPr>
+        </p:nvSpPr>
+        <p:spPr/>
+        <p:txBody>
+          <a:bodyPr/>
+          <a:lstStyle/>
+          <a:p>
+            <a:r>
+              <a:rPr lang="en-US" dirty="0"/>
+              <a:t>Xamarin itself</a:t>
+            </a:r>
+          </a:p>
+          <a:p>
+            <a:pPr lvl="1"/>
+            <a:r>
+              <a:rPr lang="en-US" dirty="0"/>
+              <a:t>Despite the platform’s age, tools seem quite buggy</a:t>
+            </a:r>
+          </a:p>
+          <a:p>
+            <a:pPr lvl="1"/>
+            <a:r>
+              <a:rPr lang="en-US" dirty="0"/>
+              <a:t>Incomplete documentation</a:t>
+            </a:r>
+          </a:p>
+        </p:txBody>
+      </p:sp>
+    </p:spTree>
+    <p:extLst>
+      <p:ext uri="{BB962C8B-B14F-4D97-AF65-F5344CB8AC3E}">
+        <p14:creationId xmlns:p14="http://schemas.microsoft.com/office/powerpoint/2010/main" val="819890317"/>
+      </p:ext>
+    </p:extLst>
+  </p:cSld>
+  <p:clrMapOvr>
+    <a:masterClrMapping/>
+  </p:clrMapOvr>
+</p:sld>
+</file>
+
+<file path=ppt/slides/slide6.xml><?xml version="1.0" encoding="utf-8"?>
+<p:sld xmlns:a="http://schemas.openxmlformats.org/drawingml/2006/main" xmlns:r="http://schemas.openxmlformats.org/officeDocument/2006/relationships" xmlns:p="http://schemas.openxmlformats.org/presentationml/2006/main">
+  <p:cSld>
+    <p:spTree>
+      <p:nvGrpSpPr>
+        <p:cNvPr id="1" name=""/>
+        <p:cNvGrpSpPr/>
+        <p:nvPr/>
+      </p:nvGrpSpPr>
+      <p:grpSpPr>
+        <a:xfrm>
+          <a:off x="0" y="0"/>
+          <a:ext cx="0" cy="0"/>
+          <a:chOff x="0" y="0"/>
+          <a:chExt cx="0" cy="0"/>
+        </a:xfrm>
+      </p:grpSpPr>
+      <p:sp>
+        <p:nvSpPr>
+          <p:cNvPr id="2" name="Title 1">
+            <a:extLst>
+              <a:ext uri="{FF2B5EF4-FFF2-40B4-BE49-F238E27FC236}">
+                <a16:creationId xmlns:a16="http://schemas.microsoft.com/office/drawing/2014/main" id="{6585CAC7-F734-41F0-B37B-ECD61E3B9F0C}"/>
+              </a:ext>
+            </a:extLst>
+          </p:cNvPr>
+          <p:cNvSpPr>
+            <a:spLocks noGrp="1"/>
+          </p:cNvSpPr>
+          <p:nvPr>
+            <p:ph type="title"/>
+          </p:nvPr>
+        </p:nvSpPr>
+        <p:spPr/>
+        <p:txBody>
+          <a:bodyPr/>
+          <a:lstStyle/>
+          <a:p>
+            <a:r>
+              <a:rPr lang="en-US" dirty="0"/>
+              <a:t>Highlights</a:t>
+            </a:r>
+          </a:p>
+        </p:txBody>
+      </p:sp>
+      <p:sp>
+        <p:nvSpPr>
+          <p:cNvPr id="3" name="Content Placeholder 2">
+            <a:extLst>
+              <a:ext uri="{FF2B5EF4-FFF2-40B4-BE49-F238E27FC236}">
+                <a16:creationId xmlns:a16="http://schemas.microsoft.com/office/drawing/2014/main" id="{4932A2C8-DC7D-42FB-AB1A-AAB51B80D61E}"/>
+              </a:ext>
+            </a:extLst>
+          </p:cNvPr>
+          <p:cNvSpPr>
+            <a:spLocks noGrp="1"/>
+          </p:cNvSpPr>
+          <p:nvPr>
+            <p:ph idx="1"/>
+          </p:nvPr>
+        </p:nvSpPr>
+        <p:spPr/>
+        <p:txBody>
+          <a:bodyPr/>
+          <a:lstStyle/>
+          <a:p>
+            <a:r>
+              <a:rPr lang="en-US" dirty="0"/>
+              <a:t>Library for interfacing with the NXT is a reusable component</a:t>
+            </a:r>
+          </a:p>
+        </p:txBody>
+      </p:sp>
+    </p:spTree>
+    <p:extLst>
+      <p:ext uri="{BB962C8B-B14F-4D97-AF65-F5344CB8AC3E}">
+        <p14:creationId xmlns:p14="http://schemas.microsoft.com/office/powerpoint/2010/main" val="3750821079"/>
+      </p:ext>
+    </p:extLst>
+  </p:cSld>
+  <p:clrMapOvr>
+    <a:masterClrMapping/>
+  </p:clrMapOvr>
+</p:sld>
+</file>
+
+<file path=ppt/slides/slide7.xml><?xml version="1.0" encoding="utf-8"?>
+<p:sld xmlns:a="http://schemas.openxmlformats.org/drawingml/2006/main" xmlns:r="http://schemas.openxmlformats.org/officeDocument/2006/relationships" xmlns:p="http://schemas.openxmlformats.org/presentationml/2006/main">
+  <p:cSld>
+    <p:spTree>
+      <p:nvGrpSpPr>
+        <p:cNvPr id="1" name=""/>
+        <p:cNvGrpSpPr/>
+        <p:nvPr/>
+      </p:nvGrpSpPr>
+      <p:grpSpPr>
+        <a:xfrm>
+          <a:off x="0" y="0"/>
+          <a:ext cx="0" cy="0"/>
+          <a:chOff x="0" y="0"/>
+          <a:chExt cx="0" cy="0"/>
+        </a:xfrm>
+      </p:grpSpPr>
+      <p:sp>
+        <p:nvSpPr>
+          <p:cNvPr id="2" name="Title 1">
+            <a:extLst>
+              <a:ext uri="{FF2B5EF4-FFF2-40B4-BE49-F238E27FC236}">
+                <a16:creationId xmlns:a16="http://schemas.microsoft.com/office/drawing/2014/main" id="{88D82C12-1330-4642-B626-68845D5F3B46}"/>
+              </a:ext>
+            </a:extLst>
+          </p:cNvPr>
+          <p:cNvSpPr>
+            <a:spLocks noGrp="1"/>
+          </p:cNvSpPr>
+          <p:nvPr>
+            <p:ph type="title"/>
+          </p:nvPr>
+        </p:nvSpPr>
+        <p:spPr/>
+        <p:txBody>
+          <a:bodyPr/>
+          <a:lstStyle/>
+          <a:p>
+            <a:r>
+              <a:rPr lang="en-US" dirty="0"/>
+              <a:t>Shortcomings</a:t>
+            </a:r>
+          </a:p>
+        </p:txBody>
+      </p:sp>
+      <p:sp>
+        <p:nvSpPr>
+          <p:cNvPr id="3" name="Content Placeholder 2">
+            <a:extLst>
+              <a:ext uri="{FF2B5EF4-FFF2-40B4-BE49-F238E27FC236}">
+                <a16:creationId xmlns:a16="http://schemas.microsoft.com/office/drawing/2014/main" id="{B4B667A3-0E69-4CB9-9F8A-48C6BF30E010}"/>
+              </a:ext>
+            </a:extLst>
+          </p:cNvPr>
+          <p:cNvSpPr>
+            <a:spLocks noGrp="1"/>
+          </p:cNvSpPr>
+          <p:nvPr>
+            <p:ph idx="1"/>
+          </p:nvPr>
+        </p:nvSpPr>
+        <p:spPr/>
+        <p:txBody>
+          <a:bodyPr/>
+          <a:lstStyle/>
+          <a:p>
+            <a:r>
+              <a:rPr lang="en-US" dirty="0"/>
+              <a:t>Didn’t have time to add EV3 support</a:t>
+            </a:r>
+          </a:p>
+          <a:p>
+            <a:r>
+              <a:rPr lang="en-US" dirty="0"/>
+              <a:t>Would have liked to test on more devices to verify cross-compatibility actually works</a:t>
+            </a:r>
+          </a:p>
+        </p:txBody>
+      </p:sp>
+    </p:spTree>
+    <p:extLst>
+      <p:ext uri="{BB962C8B-B14F-4D97-AF65-F5344CB8AC3E}">
+        <p14:creationId xmlns:p14="http://schemas.microsoft.com/office/powerpoint/2010/main" val="1153571660"/>
+      </p:ext>
+    </p:extLst>
+  </p:cSld>
+  <p:clrMapOvr>
+    <a:masterClrMapping/>
+  </p:clrMapOvr>
+</p:sld>
+</file>
+
+<file path=ppt/slides/slide8.xml><?xml version="1.0" encoding="utf-8"?>
+<p:sld xmlns:a="http://schemas.openxmlformats.org/drawingml/2006/main" xmlns:r="http://schemas.openxmlformats.org/officeDocument/2006/relationships" xmlns:p="http://schemas.openxmlformats.org/presentationml/2006/main">
+  <p:cSld>
+    <p:spTree>
+      <p:nvGrpSpPr>
+        <p:cNvPr id="1" name=""/>
+        <p:cNvGrpSpPr/>
+        <p:nvPr/>
+      </p:nvGrpSpPr>
+      <p:grpSpPr>
+        <a:xfrm>
+          <a:off x="0" y="0"/>
+          <a:ext cx="0" cy="0"/>
+          <a:chOff x="0" y="0"/>
+          <a:chExt cx="0" cy="0"/>
+        </a:xfrm>
+      </p:grpSpPr>
+      <p:sp>
+        <p:nvSpPr>
+          <p:cNvPr id="2" name="Title 1">
+            <a:extLst>
+              <a:ext uri="{FF2B5EF4-FFF2-40B4-BE49-F238E27FC236}">
+                <a16:creationId xmlns:a16="http://schemas.microsoft.com/office/drawing/2014/main" id="{A79CE1F6-C8BB-46FC-9CD9-6220D4FD69B3}"/>
+              </a:ext>
+            </a:extLst>
+          </p:cNvPr>
+          <p:cNvSpPr>
+            <a:spLocks noGrp="1"/>
+          </p:cNvSpPr>
+          <p:nvPr>
+            <p:ph type="title"/>
+          </p:nvPr>
+        </p:nvSpPr>
+        <p:spPr/>
+        <p:txBody>
+          <a:bodyPr/>
+          <a:lstStyle/>
+          <a:p>
+            <a:r>
+              <a:rPr lang="en-US" dirty="0"/>
+              <a:t>Summary</a:t>
+            </a:r>
+          </a:p>
+        </p:txBody>
+      </p:sp>
+      <p:sp>
+        <p:nvSpPr>
+          <p:cNvPr id="3" name="Content Placeholder 2">
+            <a:extLst>
+              <a:ext uri="{FF2B5EF4-FFF2-40B4-BE49-F238E27FC236}">
+                <a16:creationId xmlns:a16="http://schemas.microsoft.com/office/drawing/2014/main" id="{6461F925-FE18-49CA-A24A-D20A292E7DCF}"/>
+              </a:ext>
+            </a:extLst>
+          </p:cNvPr>
+          <p:cNvSpPr>
+            <a:spLocks noGrp="1"/>
+          </p:cNvSpPr>
+          <p:nvPr>
+            <p:ph idx="1"/>
+          </p:nvPr>
+        </p:nvSpPr>
+        <p:spPr/>
+        <p:txBody>
+          <a:bodyPr/>
+          <a:lstStyle/>
+          <a:p>
+            <a:r>
+              <a:rPr lang="en-US" dirty="0"/>
+              <a:t>Source code is on GitHub!</a:t>
+            </a:r>
+          </a:p>
+          <a:p>
+            <a:pPr lvl="1"/>
+            <a:r>
+              <a:rPr lang="en-US" dirty="0"/>
+              <a:t>URL</a:t>
+            </a:r>
+          </a:p>
+          <a:p>
+            <a:pPr lvl="1"/>
+            <a:r>
+              <a:rPr lang="en-US" dirty="0"/>
+              <a:t>Visual Studio project</a:t>
+            </a:r>
+          </a:p>
+          <a:p>
+            <a:pPr lvl="1"/>
+            <a:r>
+              <a:rPr lang="en-US" dirty="0" err="1"/>
+              <a:t>LDraw</a:t>
+            </a:r>
+            <a:r>
+              <a:rPr lang="en-US" dirty="0"/>
+              <a:t> robot model</a:t>
+            </a:r>
+          </a:p>
+        </p:txBody>
+      </p:sp>
+    </p:spTree>
+    <p:extLst>
+      <p:ext uri="{BB962C8B-B14F-4D97-AF65-F5344CB8AC3E}">
+        <p14:creationId xmlns:p14="http://schemas.microsoft.com/office/powerpoint/2010/main" val="1941590461"/>
+      </p:ext>
+    </p:extLst>
+  </p:cSld>
+  <p:clrMapOvr>
+    <a:masterClrMapping/>
+  </p:clrMapOvr>
+</p:sld>
+</file>
+
+<file path=ppt/slides/slide9.xml><?xml version="1.0" encoding="utf-8"?>
+<p:sld xmlns:a="http://schemas.openxmlformats.org/drawingml/2006/main" xmlns:r="http://schemas.openxmlformats.org/officeDocument/2006/relationships" xmlns:p="http://schemas.openxmlformats.org/presentationml/2006/main">
+  <p:cSld>
+    <p:spTree>
+      <p:nvGrpSpPr>
+        <p:cNvPr id="1" name=""/>
+        <p:cNvGrpSpPr/>
+        <p:nvPr/>
+      </p:nvGrpSpPr>
+      <p:grpSpPr>
+        <a:xfrm>
+          <a:off x="0" y="0"/>
+          <a:ext cx="0" cy="0"/>
+          <a:chOff x="0" y="0"/>
+          <a:chExt cx="0" cy="0"/>
+        </a:xfrm>
+      </p:grpSpPr>
+      <p:sp>
+        <p:nvSpPr>
+          <p:cNvPr id="4" name="Title 3">
+            <a:extLst>
+              <a:ext uri="{FF2B5EF4-FFF2-40B4-BE49-F238E27FC236}">
+                <a16:creationId xmlns:a16="http://schemas.microsoft.com/office/drawing/2014/main" id="{25825514-64B5-4EE9-A3CA-1721D4C36816}"/>
+              </a:ext>
+            </a:extLst>
+          </p:cNvPr>
+          <p:cNvSpPr>
+            <a:spLocks noGrp="1"/>
+          </p:cNvSpPr>
+          <p:nvPr>
+            <p:ph type="title"/>
+          </p:nvPr>
+        </p:nvSpPr>
+        <p:spPr/>
+        <p:txBody>
+          <a:bodyPr/>
+          <a:lstStyle/>
+          <a:p>
+            <a:r>
+              <a:rPr lang="en-US" dirty="0"/>
+              <a:t>Questions?</a:t>
+            </a:r>
+          </a:p>
+        </p:txBody>
+      </p:sp>
+      <p:sp>
+        <p:nvSpPr>
+          <p:cNvPr id="5" name="Text Placeholder 4">
+            <a:extLst>
+              <a:ext uri="{FF2B5EF4-FFF2-40B4-BE49-F238E27FC236}">
+                <a16:creationId xmlns:a16="http://schemas.microsoft.com/office/drawing/2014/main" id="{F9A5ABC3-D579-474C-8CD7-B9C242F04DF0}"/>
+              </a:ext>
+            </a:extLst>
+          </p:cNvPr>
+          <p:cNvSpPr>
+            <a:spLocks noGrp="1"/>
+          </p:cNvSpPr>
+          <p:nvPr>
+            <p:ph type="body" idx="1"/>
+          </p:nvPr>
+        </p:nvSpPr>
+        <p:spPr/>
+        <p:txBody>
+          <a:bodyPr/>
+          <a:lstStyle/>
+          <a:p>
+            <a:endParaRPr lang="en-US"/>
+          </a:p>
+        </p:txBody>
+      </p:sp>
+    </p:spTree>
+    <p:extLst>
+      <p:ext uri="{BB962C8B-B14F-4D97-AF65-F5344CB8AC3E}">
+        <p14:creationId xmlns:p14="http://schemas.microsoft.com/office/powerpoint/2010/main" val="3267433430"/>
+      </p:ext>
+    </p:extLst>
+  </p:cSld>
+  <p:clrMapOvr>
+    <a:masterClrMapping/>
+  </p:clrMapOvr>
+</p:sld>
+</file>
+
 <file path=ppt/theme/theme1.xml><?xml version="1.0" encoding="utf-8"?>
 <a:theme xmlns:a="http://schemas.openxmlformats.org/drawingml/2006/main" name="Facet">
   <a:themeElements>

</xml_diff>